<commit_message>
Altering directions for DocDB portion of lab, adding add'l comments to code for that section, adding presentation for DocDB.
</commit_message>
<xml_diff>
--- a/Presentations/AI Immersion - Phase 0 - Overview.pptx
+++ b/Presentations/AI Immersion - Phase 0 - Overview.pptx
@@ -5,19 +5,21 @@
     <p:sldMasterId id="2147484229" r:id="rId4"/>
   </p:sldMasterIdLst>
   <p:notesMasterIdLst>
-    <p:notesMasterId r:id="rId12"/>
+    <p:notesMasterId r:id="rId14"/>
   </p:notesMasterIdLst>
   <p:handoutMasterIdLst>
-    <p:handoutMasterId r:id="rId13"/>
+    <p:handoutMasterId r:id="rId15"/>
   </p:handoutMasterIdLst>
   <p:sldIdLst>
     <p:sldId id="1485" r:id="rId5"/>
     <p:sldId id="1519" r:id="rId6"/>
     <p:sldId id="1549" r:id="rId7"/>
     <p:sldId id="1553" r:id="rId8"/>
-    <p:sldId id="1554" r:id="rId9"/>
-    <p:sldId id="1555" r:id="rId10"/>
-    <p:sldId id="1532" r:id="rId11"/>
+    <p:sldId id="1557" r:id="rId9"/>
+    <p:sldId id="1556" r:id="rId10"/>
+    <p:sldId id="1554" r:id="rId11"/>
+    <p:sldId id="1555" r:id="rId12"/>
+    <p:sldId id="1532" r:id="rId13"/>
   </p:sldIdLst>
   <p:sldSz cx="12436475" cy="6994525"/>
   <p:notesSz cx="6858000" cy="9144000"/>
@@ -125,6 +127,8 @@
             <p14:sldId id="1519"/>
             <p14:sldId id="1549"/>
             <p14:sldId id="1553"/>
+            <p14:sldId id="1557"/>
+            <p14:sldId id="1556"/>
             <p14:sldId id="1554"/>
             <p14:sldId id="1555"/>
             <p14:sldId id="1532"/>
@@ -172,6 +176,10 @@
     </p:extLst>
   </p:cmAuthor>
 </p:cmAuthorLst>
+</file>
+
+<file path=ppt/revisionInfo.xml><?xml version="1.0" encoding="utf-8"?>
+<p1510:revInfo xmlns:a="http://schemas.openxmlformats.org/drawingml/2006/main" xmlns:r="http://schemas.openxmlformats.org/officeDocument/2006/relationships" xmlns:p1510="http://schemas.microsoft.com/office/powerpoint/2015/10/main"/>
 </file>
 
 <file path=ppt/handoutMasters/handoutMaster1.xml><?xml version="1.0" encoding="utf-8"?>
@@ -263,7 +271,7 @@
               <a:rPr lang="en-US" smtClean="0">
                 <a:latin typeface="Segoe UI" pitchFamily="34" charset="0"/>
               </a:rPr>
-              <a:t>4/29/2017 4:34 PM</a:t>
+              <a:t>5/6/2017 6:04 PM</a:t>
             </a:fld>
             <a:endParaRPr lang="en-US" dirty="0">
               <a:latin typeface="Segoe UI" pitchFamily="34" charset="0"/>
@@ -560,7 +568,7 @@
           <a:p>
             <a:fld id="{D18B56EA-E28F-4F92-9F16-7A6F2501B303}" type="datetime8">
               <a:rPr lang="en-US" smtClean="0"/>
-              <a:t>4/29/2017 8:54 AM</a:t>
+              <a:t>5/6/2017 3:55 PM</a:t>
             </a:fld>
             <a:endParaRPr lang="en-US" dirty="0"/>
           </a:p>
@@ -946,7 +954,7 @@
           <a:p>
             <a:fld id="{88B44C4B-E218-4158-810E-47EF8FD635FD}" type="datetime8">
               <a:rPr lang="en-US" smtClean="0"/>
-              <a:t>4/29/2017 8:54 AM</a:t>
+              <a:t>5/6/2017 3:55 PM</a:t>
             </a:fld>
             <a:endParaRPr lang="en-US" dirty="0"/>
           </a:p>
@@ -1130,7 +1138,7 @@
           <a:p>
             <a:fld id="{8683C9CD-37C6-4B53-B210-CC8F66F90493}" type="datetime8">
               <a:rPr lang="en-US" smtClean="0"/>
-              <a:t>4/29/2017 8:54 AM</a:t>
+              <a:t>5/6/2017 3:55 PM</a:t>
             </a:fld>
             <a:endParaRPr lang="en-US" dirty="0"/>
           </a:p>
@@ -1493,7 +1501,7 @@
           <a:p>
             <a:fld id="{EA2B2ED8-C573-45EF-BF68-CEC19505703A}" type="datetime8">
               <a:rPr lang="en-US" smtClean="0"/>
-              <a:t>4/29/2017 8:54 AM</a:t>
+              <a:t>5/6/2017 3:55 PM</a:t>
             </a:fld>
             <a:endParaRPr lang="en-US" dirty="0"/>
           </a:p>
@@ -1693,7 +1701,7 @@
           <a:p>
             <a:fld id="{5A70A388-5CB4-42F2-85B9-1AE1F63398FA}" type="datetime8">
               <a:rPr lang="en-US" smtClean="0"/>
-              <a:t>4/29/2017 8:54 AM</a:t>
+              <a:t>5/6/2017 3:55 PM</a:t>
             </a:fld>
             <a:endParaRPr lang="en-US" dirty="0"/>
           </a:p>
@@ -1851,7 +1859,7 @@
             <a:fld id="{B4008EB6-D09E-4580-8CD6-DDB14511944F}" type="slidenum">
               <a:rPr lang="en-US" smtClean="0"/>
               <a:pPr/>
-              <a:t>5</a:t>
+              <a:t>6</a:t>
             </a:fld>
             <a:endParaRPr lang="en-US" dirty="0"/>
           </a:p>
@@ -1874,7 +1882,7 @@
           <a:p>
             <a:fld id="{5A70A388-5CB4-42F2-85B9-1AE1F63398FA}" type="datetime8">
               <a:rPr lang="en-US" smtClean="0"/>
-              <a:t>4/29/2017 8:54 AM</a:t>
+              <a:t>5/6/2017 6:04 PM</a:t>
             </a:fld>
             <a:endParaRPr lang="en-US" dirty="0"/>
           </a:p>
@@ -1956,6 +1964,187 @@
     </p:spTree>
     <p:extLst>
       <p:ext uri="{BB962C8B-B14F-4D97-AF65-F5344CB8AC3E}">
+        <p14:creationId xmlns:p14="http://schemas.microsoft.com/office/powerpoint/2010/main" val="3515775730"/>
+      </p:ext>
+    </p:extLst>
+  </p:cSld>
+  <p:clrMapOvr>
+    <a:masterClrMapping/>
+  </p:clrMapOvr>
+</p:notes>
+</file>
+
+<file path=ppt/notesSlides/notesSlide6.xml><?xml version="1.0" encoding="utf-8"?>
+<p:notes xmlns:a="http://schemas.openxmlformats.org/drawingml/2006/main" xmlns:r="http://schemas.openxmlformats.org/officeDocument/2006/relationships" xmlns:p="http://schemas.openxmlformats.org/presentationml/2006/main">
+  <p:cSld>
+    <p:spTree>
+      <p:nvGrpSpPr>
+        <p:cNvPr id="1" name=""/>
+        <p:cNvGrpSpPr/>
+        <p:nvPr/>
+      </p:nvGrpSpPr>
+      <p:grpSpPr>
+        <a:xfrm>
+          <a:off x="0" y="0"/>
+          <a:ext cx="0" cy="0"/>
+          <a:chOff x="0" y="0"/>
+          <a:chExt cx="0" cy="0"/>
+        </a:xfrm>
+      </p:grpSpPr>
+      <p:sp>
+        <p:nvSpPr>
+          <p:cNvPr id="2" name="Slide Image Placeholder 1"/>
+          <p:cNvSpPr>
+            <a:spLocks noGrp="1" noRot="1" noChangeAspect="1"/>
+          </p:cNvSpPr>
+          <p:nvPr>
+            <p:ph type="sldImg"/>
+          </p:nvPr>
+        </p:nvSpPr>
+        <p:spPr/>
+      </p:sp>
+      <p:sp>
+        <p:nvSpPr>
+          <p:cNvPr id="3" name="Notes Placeholder 2"/>
+          <p:cNvSpPr>
+            <a:spLocks noGrp="1"/>
+          </p:cNvSpPr>
+          <p:nvPr>
+            <p:ph type="body" idx="1"/>
+          </p:nvPr>
+        </p:nvSpPr>
+        <p:spPr/>
+        <p:txBody>
+          <a:bodyPr/>
+          <a:lstStyle/>
+          <a:p>
+            <a:endParaRPr lang="en-US" dirty="0"/>
+          </a:p>
+        </p:txBody>
+      </p:sp>
+      <p:sp>
+        <p:nvSpPr>
+          <p:cNvPr id="6" name="Slide Number Placeholder 5"/>
+          <p:cNvSpPr>
+            <a:spLocks noGrp="1"/>
+          </p:cNvSpPr>
+          <p:nvPr>
+            <p:ph type="sldNum" sz="quarter" idx="12"/>
+          </p:nvPr>
+        </p:nvSpPr>
+        <p:spPr/>
+        <p:txBody>
+          <a:bodyPr/>
+          <a:lstStyle/>
+          <a:p>
+            <a:fld id="{B4008EB6-D09E-4580-8CD6-DDB14511944F}" type="slidenum">
+              <a:rPr lang="en-US" smtClean="0"/>
+              <a:pPr/>
+              <a:t>7</a:t>
+            </a:fld>
+            <a:endParaRPr lang="en-US" dirty="0"/>
+          </a:p>
+        </p:txBody>
+      </p:sp>
+      <p:sp>
+        <p:nvSpPr>
+          <p:cNvPr id="10" name="Date Placeholder 9"/>
+          <p:cNvSpPr>
+            <a:spLocks noGrp="1"/>
+          </p:cNvSpPr>
+          <p:nvPr>
+            <p:ph type="dt" idx="13"/>
+          </p:nvPr>
+        </p:nvSpPr>
+        <p:spPr/>
+        <p:txBody>
+          <a:bodyPr/>
+          <a:lstStyle/>
+          <a:p>
+            <a:fld id="{5A70A388-5CB4-42F2-85B9-1AE1F63398FA}" type="datetime8">
+              <a:rPr lang="en-US" smtClean="0"/>
+              <a:t>5/6/2017 3:55 PM</a:t>
+            </a:fld>
+            <a:endParaRPr lang="en-US" dirty="0"/>
+          </a:p>
+        </p:txBody>
+      </p:sp>
+      <p:sp>
+        <p:nvSpPr>
+          <p:cNvPr id="12" name="Header Placeholder 11"/>
+          <p:cNvSpPr>
+            <a:spLocks noGrp="1"/>
+          </p:cNvSpPr>
+          <p:nvPr>
+            <p:ph type="hdr" sz="quarter" idx="15"/>
+          </p:nvPr>
+        </p:nvSpPr>
+        <p:spPr/>
+        <p:txBody>
+          <a:bodyPr/>
+          <a:lstStyle/>
+          <a:p>
+            <a:endParaRPr lang="en-US" dirty="0"/>
+          </a:p>
+        </p:txBody>
+      </p:sp>
+      <p:sp>
+        <p:nvSpPr>
+          <p:cNvPr id="5" name="Footer Placeholder 4"/>
+          <p:cNvSpPr>
+            <a:spLocks noGrp="1"/>
+          </p:cNvSpPr>
+          <p:nvPr>
+            <p:ph type="ftr" sz="quarter" idx="16"/>
+          </p:nvPr>
+        </p:nvSpPr>
+        <p:spPr/>
+        <p:txBody>
+          <a:bodyPr/>
+          <a:lstStyle/>
+          <a:p>
+            <a:pPr defTabSz="914099" eaLnBrk="0" hangingPunct="0"/>
+            <a:r>
+              <a:rPr lang="en-US" sz="400">
+                <a:gradFill>
+                  <a:gsLst>
+                    <a:gs pos="0">
+                      <a:prstClr val="black"/>
+                    </a:gs>
+                    <a:gs pos="100000">
+                      <a:prstClr val="black"/>
+                    </a:gs>
+                  </a:gsLst>
+                  <a:lin ang="5400000" scaled="0"/>
+                </a:gradFill>
+                <a:latin typeface="Segoe UI" pitchFamily="34" charset="0"/>
+                <a:ea typeface="Segoe UI" pitchFamily="34" charset="0"/>
+                <a:cs typeface="Segoe UI" pitchFamily="34" charset="0"/>
+              </a:rPr>
+              <a:t>© Microsoft Corporation. All rights reserved. MICROSOFT MAKES NO WARRANTIES, EXPRESS, IMPLIED OR STATUTORY, AS TO THE INFORMATION IN THIS PRESENTATION.</a:t>
+            </a:r>
+            <a:endParaRPr lang="en-US" sz="400" dirty="0">
+              <a:gradFill>
+                <a:gsLst>
+                  <a:gs pos="0">
+                    <a:prstClr val="black"/>
+                  </a:gs>
+                  <a:gs pos="100000">
+                    <a:prstClr val="black"/>
+                  </a:gs>
+                </a:gsLst>
+                <a:lin ang="5400000" scaled="0"/>
+              </a:gradFill>
+              <a:latin typeface="Segoe UI" pitchFamily="34" charset="0"/>
+              <a:ea typeface="Segoe UI" pitchFamily="34" charset="0"/>
+              <a:cs typeface="Segoe UI" pitchFamily="34" charset="0"/>
+            </a:endParaRPr>
+          </a:p>
+        </p:txBody>
+      </p:sp>
+    </p:spTree>
+    <p:extLst>
+      <p:ext uri="{BB962C8B-B14F-4D97-AF65-F5344CB8AC3E}">
         <p14:creationId xmlns:p14="http://schemas.microsoft.com/office/powerpoint/2010/main" val="3271016396"/>
       </p:ext>
     </p:extLst>
@@ -1966,7 +2155,7 @@
 </p:notes>
 </file>
 
-<file path=ppt/notesSlides/notesSlide6.xml><?xml version="1.0" encoding="utf-8"?>
+<file path=ppt/notesSlides/notesSlide7.xml><?xml version="1.0" encoding="utf-8"?>
 <p:notes xmlns:a="http://schemas.openxmlformats.org/drawingml/2006/main" xmlns:r="http://schemas.openxmlformats.org/officeDocument/2006/relationships" xmlns:p="http://schemas.openxmlformats.org/presentationml/2006/main">
   <p:cSld>
     <p:spTree>
@@ -2076,7 +2265,7 @@
                   <a:prstClr val="black"/>
                 </a:solidFill>
               </a:rPr>
-              <a:t>4/29/2017 8:54 AM</a:t>
+              <a:t>5/6/2017 3:55 PM</a:t>
             </a:fld>
             <a:endParaRPr lang="en-US" dirty="0">
               <a:solidFill>
@@ -2108,7 +2297,7 @@
                 </a:solidFill>
               </a:rPr>
               <a:pPr/>
-              <a:t>7</a:t>
+              <a:t>9</a:t>
             </a:fld>
             <a:endParaRPr lang="en-US" dirty="0">
               <a:solidFill>
@@ -8573,10 +8762,16 @@
           <a:lstStyle/>
           <a:p>
             <a:r>
-              <a:rPr lang="en-US"/>
-              <a:t>Presentation title</a:t>
-            </a:r>
-            <a:endParaRPr lang="en-US" dirty="0"/>
+              <a:rPr lang="en-US" dirty="0"/>
+              <a:t>Intelligent Apps</a:t>
+            </a:r>
+            <a:br>
+              <a:rPr lang="en-US" dirty="0"/>
+            </a:br>
+            <a:r>
+              <a:rPr lang="en-US" dirty="0"/>
+              <a:t>Using Cognitive Services</a:t>
+            </a:r>
           </a:p>
         </p:txBody>
       </p:sp>
@@ -8596,16 +8791,15 @@
           <a:lstStyle/>
           <a:p>
             <a:r>
-              <a:rPr lang="en-US"/>
-              <a:t>Speaker Name</a:t>
-            </a:r>
-          </a:p>
-          <a:p>
-            <a:r>
-              <a:rPr lang="en-US"/>
-              <a:t>Title</a:t>
-            </a:r>
-            <a:endParaRPr lang="en-US" dirty="0"/>
+              <a:rPr lang="en-US" dirty="0"/>
+              <a:t>Michael Lanzetta</a:t>
+            </a:r>
+          </a:p>
+          <a:p>
+            <a:r>
+              <a:rPr lang="en-US" dirty="0"/>
+              <a:t>Principal SDE</a:t>
+            </a:r>
           </a:p>
         </p:txBody>
       </p:sp>
@@ -8845,7 +9039,7 @@
         <p:spPr>
           <a:xfrm>
             <a:off x="274702" y="1058862"/>
-            <a:ext cx="11888787" cy="5964710"/>
+            <a:ext cx="11888787" cy="3120854"/>
           </a:xfrm>
         </p:spPr>
         <p:txBody>
@@ -8860,21 +9054,15 @@
           <a:p>
             <a:r>
               <a:rPr lang="en-US" dirty="0"/>
-              <a:t>Phase 1 – 11:00 – 2:15</a:t>
-            </a:r>
-          </a:p>
-          <a:p>
-            <a:pPr lvl="1"/>
+              <a:t>Phase 1 </a:t>
+            </a:r>
+            <a:r>
+              <a:rPr lang="en-US"/>
+              <a:t>+ Lunch – </a:t>
+            </a:r>
             <a:r>
               <a:rPr lang="en-US" dirty="0"/>
-              <a:t>Tour of the Cognitive Services and DocumentDB</a:t>
-            </a:r>
-          </a:p>
-          <a:p>
-            <a:pPr lvl="1"/>
-            <a:r>
-              <a:rPr lang="en-US" dirty="0"/>
-              <a:t>Hands-on – Calling Vision Services, Writing to DocumentDB</a:t>
+              <a:t>11:00 – 2:15</a:t>
             </a:r>
           </a:p>
           <a:p>
@@ -8884,37 +9072,9 @@
             </a:r>
           </a:p>
           <a:p>
-            <a:pPr lvl="1"/>
-            <a:r>
-              <a:rPr lang="en-US" dirty="0"/>
-              <a:t>Tour of Azure Search</a:t>
-            </a:r>
-          </a:p>
-          <a:p>
-            <a:pPr lvl="1"/>
-            <a:r>
-              <a:rPr lang="en-US" dirty="0"/>
-              <a:t>Hands-on –Building and Querying an Index</a:t>
-            </a:r>
-          </a:p>
-          <a:p>
             <a:r>
               <a:rPr lang="en-US" dirty="0"/>
               <a:t>Phase 3 – 3:30 – 5:00</a:t>
-            </a:r>
-          </a:p>
-          <a:p>
-            <a:pPr lvl="1"/>
-            <a:r>
-              <a:rPr lang="en-US" dirty="0"/>
-              <a:t>Tour of the Bot Framework</a:t>
-            </a:r>
-          </a:p>
-          <a:p>
-            <a:pPr lvl="1"/>
-            <a:r>
-              <a:rPr lang="en-US" dirty="0"/>
-              <a:t>Hands-on – Building a Query Bot</a:t>
             </a:r>
           </a:p>
           <a:p>
@@ -8969,6 +9129,136 @@
       </p:grpSpPr>
       <p:sp>
         <p:nvSpPr>
+          <p:cNvPr id="2" name="Title 1"/>
+          <p:cNvSpPr>
+            <a:spLocks noGrp="1"/>
+          </p:cNvSpPr>
+          <p:nvPr>
+            <p:ph type="title"/>
+          </p:nvPr>
+        </p:nvSpPr>
+        <p:spPr/>
+        <p:txBody>
+          <a:bodyPr/>
+          <a:lstStyle/>
+          <a:p>
+            <a:r>
+              <a:rPr lang="en-US" dirty="0"/>
+              <a:t>Scenario</a:t>
+            </a:r>
+          </a:p>
+        </p:txBody>
+      </p:sp>
+      <p:sp>
+        <p:nvSpPr>
+          <p:cNvPr id="3" name="Text Placeholder 2"/>
+          <p:cNvSpPr>
+            <a:spLocks noGrp="1"/>
+          </p:cNvSpPr>
+          <p:nvPr>
+            <p:ph type="body" sz="quarter" idx="10"/>
+          </p:nvPr>
+        </p:nvSpPr>
+        <p:spPr>
+          <a:xfrm>
+            <a:off x="261409" y="1439862"/>
+            <a:ext cx="4876735" cy="4727448"/>
+          </a:xfrm>
+        </p:spPr>
+        <p:txBody>
+          <a:bodyPr/>
+          <a:lstStyle/>
+          <a:p>
+            <a:r>
+              <a:rPr lang="en-US" dirty="0"/>
+              <a:t>Intelligence from Images</a:t>
+            </a:r>
+          </a:p>
+          <a:p>
+            <a:r>
+              <a:rPr lang="en-US" dirty="0"/>
+              <a:t>Vision Services</a:t>
+            </a:r>
+          </a:p>
+          <a:p>
+            <a:r>
+              <a:rPr lang="en-US" dirty="0"/>
+              <a:t>Cloud Storage</a:t>
+            </a:r>
+          </a:p>
+          <a:p>
+            <a:r>
+              <a:rPr lang="en-US" dirty="0"/>
+              <a:t>Search</a:t>
+            </a:r>
+          </a:p>
+          <a:p>
+            <a:r>
+              <a:rPr lang="en-US" dirty="0"/>
+              <a:t>Conversation and Language Understanding</a:t>
+            </a:r>
+          </a:p>
+        </p:txBody>
+      </p:sp>
+      <p:pic>
+        <p:nvPicPr>
+          <p:cNvPr id="5" name="Picture 4"/>
+          <p:cNvPicPr>
+            <a:picLocks noChangeAspect="1"/>
+          </p:cNvPicPr>
+          <p:nvPr/>
+        </p:nvPicPr>
+        <p:blipFill>
+          <a:blip r:embed="rId2"/>
+          <a:stretch>
+            <a:fillRect/>
+          </a:stretch>
+        </p:blipFill>
+        <p:spPr>
+          <a:xfrm>
+            <a:off x="5456237" y="1212849"/>
+            <a:ext cx="6172200" cy="5254085"/>
+          </a:xfrm>
+          <a:prstGeom prst="rect">
+            <a:avLst/>
+          </a:prstGeom>
+        </p:spPr>
+      </p:pic>
+    </p:spTree>
+    <p:extLst>
+      <p:ext uri="{BB962C8B-B14F-4D97-AF65-F5344CB8AC3E}">
+        <p14:creationId xmlns:p14="http://schemas.microsoft.com/office/powerpoint/2010/main" val="3831601975"/>
+      </p:ext>
+    </p:extLst>
+  </p:cSld>
+  <p:clrMapOvr>
+    <a:masterClrMapping/>
+  </p:clrMapOvr>
+  <p:transition>
+    <p:fade/>
+  </p:transition>
+</p:sld>
+</file>
+
+<file path=ppt/slides/slide6.xml><?xml version="1.0" encoding="utf-8"?>
+<p:sld xmlns:a="http://schemas.openxmlformats.org/drawingml/2006/main" xmlns:r="http://schemas.openxmlformats.org/officeDocument/2006/relationships" xmlns:p="http://schemas.openxmlformats.org/presentationml/2006/main">
+  <p:cSld>
+    <p:spTree>
+      <p:nvGrpSpPr>
+        <p:cNvPr id="1" name=""/>
+        <p:cNvGrpSpPr/>
+        <p:nvPr/>
+      </p:nvGrpSpPr>
+      <p:grpSpPr>
+        <a:xfrm>
+          <a:off x="0" y="0"/>
+          <a:ext cx="0" cy="0"/>
+          <a:chOff x="0" y="0"/>
+          <a:chExt cx="0" cy="0"/>
+        </a:xfrm>
+      </p:grpSpPr>
+      <p:sp>
+        <p:nvSpPr>
           <p:cNvPr id="17" name="Title 16"/>
           <p:cNvSpPr>
             <a:spLocks noGrp="1"/>
@@ -8984,7 +9274,7 @@
           <a:p>
             <a:r>
               <a:rPr lang="en-US" dirty="0"/>
-              <a:t>Setup</a:t>
+              <a:t>Agenda</a:t>
             </a:r>
           </a:p>
         </p:txBody>
@@ -9002,7 +9292,7 @@
         <p:spPr>
           <a:xfrm>
             <a:off x="274702" y="1058862"/>
-            <a:ext cx="11888787" cy="5386090"/>
+            <a:ext cx="11888787" cy="5964710"/>
           </a:xfrm>
         </p:spPr>
         <p:txBody>
@@ -9011,6 +9301,163 @@
           <a:p>
             <a:r>
               <a:rPr lang="en-US" dirty="0"/>
+              <a:t>Overview and Scenario</a:t>
+            </a:r>
+          </a:p>
+          <a:p>
+            <a:r>
+              <a:rPr lang="en-US" dirty="0"/>
+              <a:t>Phase 1 – 11:00 – 2:15</a:t>
+            </a:r>
+          </a:p>
+          <a:p>
+            <a:pPr lvl="1"/>
+            <a:r>
+              <a:rPr lang="en-US" dirty="0"/>
+              <a:t>Tour of the Cognitive Services and DocumentDB</a:t>
+            </a:r>
+          </a:p>
+          <a:p>
+            <a:pPr lvl="1"/>
+            <a:r>
+              <a:rPr lang="en-US" dirty="0"/>
+              <a:t>Hands-on – Calling Vision Services, Writing to DocumentDB</a:t>
+            </a:r>
+          </a:p>
+          <a:p>
+            <a:r>
+              <a:rPr lang="en-US" dirty="0"/>
+              <a:t>Phase 2 – 2:15 – 3:30</a:t>
+            </a:r>
+          </a:p>
+          <a:p>
+            <a:pPr lvl="1"/>
+            <a:r>
+              <a:rPr lang="en-US" dirty="0"/>
+              <a:t>Tour of Azure Search</a:t>
+            </a:r>
+          </a:p>
+          <a:p>
+            <a:pPr lvl="1"/>
+            <a:r>
+              <a:rPr lang="en-US" dirty="0"/>
+              <a:t>Hands-on –Building and Querying an Index</a:t>
+            </a:r>
+          </a:p>
+          <a:p>
+            <a:r>
+              <a:rPr lang="en-US" dirty="0"/>
+              <a:t>Phase 3 – 3:30 – 5:00</a:t>
+            </a:r>
+          </a:p>
+          <a:p>
+            <a:pPr lvl="1"/>
+            <a:r>
+              <a:rPr lang="en-US" dirty="0"/>
+              <a:t>Tour of the Bot Framework</a:t>
+            </a:r>
+          </a:p>
+          <a:p>
+            <a:pPr lvl="1"/>
+            <a:r>
+              <a:rPr lang="en-US" dirty="0"/>
+              <a:t>Hands-on – Building a Query Bot</a:t>
+            </a:r>
+          </a:p>
+          <a:p>
+            <a:r>
+              <a:rPr lang="en-US" dirty="0"/>
+              <a:t>Concluding Remarks</a:t>
+            </a:r>
+          </a:p>
+        </p:txBody>
+      </p:sp>
+    </p:spTree>
+    <p:extLst>
+      <p:ext uri="{BB962C8B-B14F-4D97-AF65-F5344CB8AC3E}">
+        <p14:creationId xmlns:p14="http://schemas.microsoft.com/office/powerpoint/2010/main" val="3859324103"/>
+      </p:ext>
+    </p:extLst>
+  </p:cSld>
+  <p:clrMapOvr>
+    <a:masterClrMapping/>
+  </p:clrMapOvr>
+  <mc:AlternateContent xmlns:mc="http://schemas.openxmlformats.org/markup-compatibility/2006" xmlns:p14="http://schemas.microsoft.com/office/powerpoint/2010/main">
+    <mc:Choice Requires="p14">
+      <p:transition spd="med" p14:dur="700">
+        <p:fade/>
+      </p:transition>
+    </mc:Choice>
+    <mc:Fallback xmlns="">
+      <p:transition spd="med">
+        <p:fade/>
+      </p:transition>
+    </mc:Fallback>
+  </mc:AlternateContent>
+</p:sld>
+</file>
+
+<file path=ppt/slides/slide7.xml><?xml version="1.0" encoding="utf-8"?>
+<p:sld xmlns:a="http://schemas.openxmlformats.org/drawingml/2006/main" xmlns:r="http://schemas.openxmlformats.org/officeDocument/2006/relationships" xmlns:p="http://schemas.openxmlformats.org/presentationml/2006/main">
+  <p:cSld>
+    <p:spTree>
+      <p:nvGrpSpPr>
+        <p:cNvPr id="1" name=""/>
+        <p:cNvGrpSpPr/>
+        <p:nvPr/>
+      </p:nvGrpSpPr>
+      <p:grpSpPr>
+        <a:xfrm>
+          <a:off x="0" y="0"/>
+          <a:ext cx="0" cy="0"/>
+          <a:chOff x="0" y="0"/>
+          <a:chExt cx="0" cy="0"/>
+        </a:xfrm>
+      </p:grpSpPr>
+      <p:sp>
+        <p:nvSpPr>
+          <p:cNvPr id="17" name="Title 16"/>
+          <p:cNvSpPr>
+            <a:spLocks noGrp="1"/>
+          </p:cNvSpPr>
+          <p:nvPr>
+            <p:ph type="title"/>
+          </p:nvPr>
+        </p:nvSpPr>
+        <p:spPr/>
+        <p:txBody>
+          <a:bodyPr/>
+          <a:lstStyle/>
+          <a:p>
+            <a:r>
+              <a:rPr lang="en-US" dirty="0"/>
+              <a:t>Setup</a:t>
+            </a:r>
+          </a:p>
+        </p:txBody>
+      </p:sp>
+      <p:sp>
+        <p:nvSpPr>
+          <p:cNvPr id="6" name="Text Placeholder 5"/>
+          <p:cNvSpPr>
+            <a:spLocks noGrp="1"/>
+          </p:cNvSpPr>
+          <p:nvPr>
+            <p:ph type="body" sz="quarter" idx="10"/>
+          </p:nvPr>
+        </p:nvSpPr>
+        <p:spPr>
+          <a:xfrm>
+            <a:off x="274702" y="1058862"/>
+            <a:ext cx="11888787" cy="5860066"/>
+          </a:xfrm>
+        </p:spPr>
+        <p:txBody>
+          <a:bodyPr/>
+          <a:lstStyle/>
+          <a:p>
+            <a:r>
+              <a:rPr lang="en-US" dirty="0"/>
               <a:t>Azure Pass</a:t>
             </a:r>
           </a:p>
@@ -9025,7 +9472,14 @@
             <a:pPr lvl="1"/>
             <a:r>
               <a:rPr lang="en-US" dirty="0"/>
-              <a:t>Log into Portal </a:t>
+              <a:t>Log into Portal</a:t>
+            </a:r>
+          </a:p>
+          <a:p>
+            <a:pPr lvl="1"/>
+            <a:r>
+              <a:rPr lang="en-US" dirty="0"/>
+              <a:t>Visual Studio: Don’t have it? Deploy a VM!</a:t>
             </a:r>
           </a:p>
           <a:p>
@@ -9110,7 +9564,7 @@
 </p:sld>
 </file>
 
-<file path=ppt/slides/slide6.xml><?xml version="1.0" encoding="utf-8"?>
+<file path=ppt/slides/slide8.xml><?xml version="1.0" encoding="utf-8"?>
 <p:sld xmlns:a="http://schemas.openxmlformats.org/drawingml/2006/main" xmlns:r="http://schemas.openxmlformats.org/officeDocument/2006/relationships" xmlns:p="http://schemas.openxmlformats.org/presentationml/2006/main">
   <p:cSld>
     <p:spTree>
@@ -9268,7 +9722,7 @@
 </p:sld>
 </file>
 
-<file path=ppt/slides/slide7.xml><?xml version="1.0" encoding="utf-8"?>
+<file path=ppt/slides/slide9.xml><?xml version="1.0" encoding="utf-8"?>
 <p:sld xmlns:a="http://schemas.openxmlformats.org/drawingml/2006/main" xmlns:r="http://schemas.openxmlformats.org/officeDocument/2006/relationships" xmlns:p="http://schemas.openxmlformats.org/presentationml/2006/main">
   <p:cSld>
     <p:spTree>

</xml_diff>